<commit_message>
modified:   Review/Review 2/Review 2 (18CS810).pdf 	modified:   Review/Review 2/Review 2 (18CS810).pptx
</commit_message>
<xml_diff>
--- a/Review/Review 2/Review 2 (18CS810).pptx
+++ b/Review/Review 2/Review 2 (18CS810).pptx
@@ -3934,7 +3934,7 @@
               <a:buSzTx/>
               <a:buFontTx/>
               <a:buNone/>
-              <a:defRPr sz="2100">
+              <a:defRPr i="1" sz="2100">
                 <a:latin typeface="Cambria"/>
                 <a:ea typeface="Cambria"/>
                 <a:cs typeface="Cambria"/>
@@ -3956,7 +3956,7 @@
               </a:defRPr>
             </a:pPr>
             <a:r>
-              <a:t>In today's world, barcodes are the typical means of billing. But with RFID tags getting cheaper, this might see a significant change in the future. Considering the fact, that RFID scanning and billing also proves to be much secure, it may be the future of standard billing in offline stores.</a:t>
+              <a:t>In today’s world, barcode scanning is the typical means of billing. But we have carried out research on RFID scanning and we tend to develop a RFID scanner that will be embedded into shopping trolleys to carry out automated billing. We then develop a Recommendation Engine for Shopkeepers. We tend to increase the sales of the offline store.</a:t>
             </a:r>
           </a:p>
           <a:p>

</xml_diff>